<commit_message>
ppt 버튼 변환 (EmergencyButtons, AutoButtons, StartButtons, ResetButtons )
</commit_message>
<xml_diff>
--- a/DsDotNet/src/Model/Import/Model.Import.Office/sample/ds.pptx
+++ b/DsDotNet/src/Model/Import/Model.Import.Office/sample/ds.pptx
@@ -206,7 +206,7 @@
           <a:p>
             <a:fld id="{2B89E2EC-FE27-4C5F-972C-0BECC28DD028}" type="datetimeFigureOut">
               <a:rPr lang="ko-KR" altLang="en-US" smtClean="0"/>
-              <a:t>2022-10-18</a:t>
+              <a:t>2022-10-19</a:t>
             </a:fld>
             <a:endParaRPr lang="ko-KR" altLang="en-US"/>
           </a:p>
@@ -620,7 +620,7 @@
           <a:p>
             <a:fld id="{74A2778E-F063-4908-8427-F8B35A4747CF}" type="datetimeFigureOut">
               <a:rPr lang="ko-KR" altLang="en-US" smtClean="0"/>
-              <a:t>2022-10-18</a:t>
+              <a:t>2022-10-19</a:t>
             </a:fld>
             <a:endParaRPr lang="ko-KR" altLang="en-US"/>
           </a:p>
@@ -818,7 +818,7 @@
           <a:p>
             <a:fld id="{74A2778E-F063-4908-8427-F8B35A4747CF}" type="datetimeFigureOut">
               <a:rPr lang="ko-KR" altLang="en-US" smtClean="0"/>
-              <a:t>2022-10-18</a:t>
+              <a:t>2022-10-19</a:t>
             </a:fld>
             <a:endParaRPr lang="ko-KR" altLang="en-US"/>
           </a:p>
@@ -1026,7 +1026,7 @@
           <a:p>
             <a:fld id="{74A2778E-F063-4908-8427-F8B35A4747CF}" type="datetimeFigureOut">
               <a:rPr lang="ko-KR" altLang="en-US" smtClean="0"/>
-              <a:t>2022-10-18</a:t>
+              <a:t>2022-10-19</a:t>
             </a:fld>
             <a:endParaRPr lang="ko-KR" altLang="en-US"/>
           </a:p>
@@ -1224,7 +1224,7 @@
           <a:p>
             <a:fld id="{74A2778E-F063-4908-8427-F8B35A4747CF}" type="datetimeFigureOut">
               <a:rPr lang="ko-KR" altLang="en-US" smtClean="0"/>
-              <a:t>2022-10-18</a:t>
+              <a:t>2022-10-19</a:t>
             </a:fld>
             <a:endParaRPr lang="ko-KR" altLang="en-US"/>
           </a:p>
@@ -1499,7 +1499,7 @@
           <a:p>
             <a:fld id="{74A2778E-F063-4908-8427-F8B35A4747CF}" type="datetimeFigureOut">
               <a:rPr lang="ko-KR" altLang="en-US" smtClean="0"/>
-              <a:t>2022-10-18</a:t>
+              <a:t>2022-10-19</a:t>
             </a:fld>
             <a:endParaRPr lang="ko-KR" altLang="en-US"/>
           </a:p>
@@ -1764,7 +1764,7 @@
           <a:p>
             <a:fld id="{74A2778E-F063-4908-8427-F8B35A4747CF}" type="datetimeFigureOut">
               <a:rPr lang="ko-KR" altLang="en-US" smtClean="0"/>
-              <a:t>2022-10-18</a:t>
+              <a:t>2022-10-19</a:t>
             </a:fld>
             <a:endParaRPr lang="ko-KR" altLang="en-US"/>
           </a:p>
@@ -2176,7 +2176,7 @@
           <a:p>
             <a:fld id="{74A2778E-F063-4908-8427-F8B35A4747CF}" type="datetimeFigureOut">
               <a:rPr lang="ko-KR" altLang="en-US" smtClean="0"/>
-              <a:t>2022-10-18</a:t>
+              <a:t>2022-10-19</a:t>
             </a:fld>
             <a:endParaRPr lang="ko-KR" altLang="en-US"/>
           </a:p>
@@ -2317,7 +2317,7 @@
           <a:p>
             <a:fld id="{74A2778E-F063-4908-8427-F8B35A4747CF}" type="datetimeFigureOut">
               <a:rPr lang="ko-KR" altLang="en-US" smtClean="0"/>
-              <a:t>2022-10-18</a:t>
+              <a:t>2022-10-19</a:t>
             </a:fld>
             <a:endParaRPr lang="ko-KR" altLang="en-US"/>
           </a:p>
@@ -2430,7 +2430,7 @@
           <a:p>
             <a:fld id="{74A2778E-F063-4908-8427-F8B35A4747CF}" type="datetimeFigureOut">
               <a:rPr lang="ko-KR" altLang="en-US" smtClean="0"/>
-              <a:t>2022-10-18</a:t>
+              <a:t>2022-10-19</a:t>
             </a:fld>
             <a:endParaRPr lang="ko-KR" altLang="en-US"/>
           </a:p>
@@ -2741,7 +2741,7 @@
           <a:p>
             <a:fld id="{74A2778E-F063-4908-8427-F8B35A4747CF}" type="datetimeFigureOut">
               <a:rPr lang="ko-KR" altLang="en-US" smtClean="0"/>
-              <a:t>2022-10-18</a:t>
+              <a:t>2022-10-19</a:t>
             </a:fld>
             <a:endParaRPr lang="ko-KR" altLang="en-US"/>
           </a:p>
@@ -3029,7 +3029,7 @@
           <a:p>
             <a:fld id="{74A2778E-F063-4908-8427-F8B35A4747CF}" type="datetimeFigureOut">
               <a:rPr lang="ko-KR" altLang="en-US" smtClean="0"/>
-              <a:t>2022-10-18</a:t>
+              <a:t>2022-10-19</a:t>
             </a:fld>
             <a:endParaRPr lang="ko-KR" altLang="en-US"/>
           </a:p>
@@ -3270,7 +3270,7 @@
           <a:p>
             <a:fld id="{74A2778E-F063-4908-8427-F8B35A4747CF}" type="datetimeFigureOut">
               <a:rPr lang="ko-KR" altLang="en-US" smtClean="0"/>
-              <a:t>2022-10-18</a:t>
+              <a:t>2022-10-19</a:t>
             </a:fld>
             <a:endParaRPr lang="ko-KR" altLang="en-US"/>
           </a:p>
@@ -3671,7 +3671,7 @@
 </file>
 
 <file path=ppt/slides/slide1.xml><?xml version="1.0" encoding="utf-8"?>
-<p:sld xmlns:a="http://schemas.openxmlformats.org/drawingml/2006/main" xmlns:r="http://schemas.openxmlformats.org/officeDocument/2006/relationships" xmlns:p="http://schemas.openxmlformats.org/presentationml/2006/main" show="0">
+<p:sld xmlns:a="http://schemas.openxmlformats.org/drawingml/2006/main" xmlns:r="http://schemas.openxmlformats.org/officeDocument/2006/relationships" xmlns:p="http://schemas.openxmlformats.org/presentationml/2006/main">
   <p:cSld>
     <p:spTree>
       <p:nvGrpSpPr>
@@ -4033,6 +4033,230 @@
           </a:fontRef>
         </p:style>
       </p:cxnSp>
+      <p:sp>
+        <p:nvSpPr>
+          <p:cNvPr id="10" name="&quot;허용 안 됨&quot; 기호 9">
+            <a:extLst>
+              <a:ext uri="{FF2B5EF4-FFF2-40B4-BE49-F238E27FC236}">
+                <a16:creationId xmlns:a16="http://schemas.microsoft.com/office/drawing/2014/main" id="{DAE75020-D0C5-6B0A-3792-8CE6FC3760CC}"/>
+              </a:ext>
+            </a:extLst>
+          </p:cNvPr>
+          <p:cNvSpPr/>
+          <p:nvPr/>
+        </p:nvSpPr>
+        <p:spPr>
+          <a:xfrm>
+            <a:off x="2449902" y="4364966"/>
+            <a:ext cx="2070340" cy="1492370"/>
+          </a:xfrm>
+          <a:prstGeom prst="noSmoking">
+            <a:avLst/>
+          </a:prstGeom>
+        </p:spPr>
+        <p:style>
+          <a:lnRef idx="2">
+            <a:schemeClr val="accent1">
+              <a:shade val="50000"/>
+            </a:schemeClr>
+          </a:lnRef>
+          <a:fillRef idx="1">
+            <a:schemeClr val="accent1"/>
+          </a:fillRef>
+          <a:effectRef idx="0">
+            <a:schemeClr val="accent1"/>
+          </a:effectRef>
+          <a:fontRef idx="minor">
+            <a:schemeClr val="lt1"/>
+          </a:fontRef>
+        </p:style>
+        <p:txBody>
+          <a:bodyPr rtlCol="0" anchor="ctr"/>
+          <a:lstStyle/>
+          <a:p>
+            <a:pPr algn="ctr"/>
+            <a:r>
+              <a:rPr lang="en-US" altLang="ko-KR" dirty="0">
+                <a:solidFill>
+                  <a:schemeClr val="tx1"/>
+                </a:solidFill>
+              </a:rPr>
+              <a:t>EEE</a:t>
+            </a:r>
+            <a:endParaRPr lang="ko-KR" altLang="en-US" dirty="0">
+              <a:solidFill>
+                <a:schemeClr val="tx1"/>
+              </a:solidFill>
+            </a:endParaRPr>
+          </a:p>
+        </p:txBody>
+      </p:sp>
+      <p:sp>
+        <p:nvSpPr>
+          <p:cNvPr id="11" name="사각형: 빗면 10">
+            <a:extLst>
+              <a:ext uri="{FF2B5EF4-FFF2-40B4-BE49-F238E27FC236}">
+                <a16:creationId xmlns:a16="http://schemas.microsoft.com/office/drawing/2014/main" id="{1C5DC0AE-BB9C-C690-5903-3A6CF9C95CD0}"/>
+              </a:ext>
+            </a:extLst>
+          </p:cNvPr>
+          <p:cNvSpPr/>
+          <p:nvPr/>
+        </p:nvSpPr>
+        <p:spPr>
+          <a:xfrm>
+            <a:off x="4863063" y="4403819"/>
+            <a:ext cx="1104181" cy="1245933"/>
+          </a:xfrm>
+          <a:prstGeom prst="bevel">
+            <a:avLst/>
+          </a:prstGeom>
+        </p:spPr>
+        <p:style>
+          <a:lnRef idx="2">
+            <a:schemeClr val="accent1">
+              <a:shade val="50000"/>
+            </a:schemeClr>
+          </a:lnRef>
+          <a:fillRef idx="1">
+            <a:schemeClr val="accent1"/>
+          </a:fillRef>
+          <a:effectRef idx="0">
+            <a:schemeClr val="accent1"/>
+          </a:effectRef>
+          <a:fontRef idx="minor">
+            <a:schemeClr val="lt1"/>
+          </a:fontRef>
+        </p:style>
+        <p:txBody>
+          <a:bodyPr rtlCol="0" anchor="ctr"/>
+          <a:lstStyle/>
+          <a:p>
+            <a:pPr algn="ctr"/>
+            <a:r>
+              <a:rPr lang="en-US" altLang="ko-KR" dirty="0"/>
+              <a:t>SSS</a:t>
+            </a:r>
+            <a:endParaRPr lang="ko-KR" altLang="en-US" dirty="0"/>
+          </a:p>
+        </p:txBody>
+      </p:sp>
+      <p:sp>
+        <p:nvSpPr>
+          <p:cNvPr id="14" name="막힌 원호 13">
+            <a:extLst>
+              <a:ext uri="{FF2B5EF4-FFF2-40B4-BE49-F238E27FC236}">
+                <a16:creationId xmlns:a16="http://schemas.microsoft.com/office/drawing/2014/main" id="{DC166F15-3949-6826-10B5-CEE575BD20BC}"/>
+              </a:ext>
+            </a:extLst>
+          </p:cNvPr>
+          <p:cNvSpPr/>
+          <p:nvPr/>
+        </p:nvSpPr>
+        <p:spPr>
+          <a:xfrm>
+            <a:off x="4770408" y="3864668"/>
+            <a:ext cx="1196836" cy="1078302"/>
+          </a:xfrm>
+          <a:prstGeom prst="blockArc">
+            <a:avLst/>
+          </a:prstGeom>
+        </p:spPr>
+        <p:style>
+          <a:lnRef idx="2">
+            <a:schemeClr val="accent1">
+              <a:shade val="50000"/>
+            </a:schemeClr>
+          </a:lnRef>
+          <a:fillRef idx="1">
+            <a:schemeClr val="accent1"/>
+          </a:fillRef>
+          <a:effectRef idx="0">
+            <a:schemeClr val="accent1"/>
+          </a:effectRef>
+          <a:fontRef idx="minor">
+            <a:schemeClr val="lt1"/>
+          </a:fontRef>
+        </p:style>
+        <p:txBody>
+          <a:bodyPr rtlCol="0" anchor="ctr"/>
+          <a:lstStyle/>
+          <a:p>
+            <a:pPr algn="ctr"/>
+            <a:r>
+              <a:rPr lang="en-US" altLang="ko-KR" dirty="0" err="1">
+                <a:solidFill>
+                  <a:schemeClr val="tx1"/>
+                </a:solidFill>
+              </a:rPr>
+              <a:t>RRR</a:t>
+            </a:r>
+            <a:endParaRPr lang="ko-KR" altLang="en-US" dirty="0">
+              <a:solidFill>
+                <a:schemeClr val="tx1"/>
+              </a:solidFill>
+            </a:endParaRPr>
+          </a:p>
+        </p:txBody>
+      </p:sp>
+      <p:sp>
+        <p:nvSpPr>
+          <p:cNvPr id="15" name="원형: 비어 있음 14">
+            <a:extLst>
+              <a:ext uri="{FF2B5EF4-FFF2-40B4-BE49-F238E27FC236}">
+                <a16:creationId xmlns:a16="http://schemas.microsoft.com/office/drawing/2014/main" id="{D1691932-8F82-B188-4B07-3ADEE7A70C6F}"/>
+              </a:ext>
+            </a:extLst>
+          </p:cNvPr>
+          <p:cNvSpPr/>
+          <p:nvPr/>
+        </p:nvSpPr>
+        <p:spPr>
+          <a:xfrm>
+            <a:off x="6978770" y="4166558"/>
+            <a:ext cx="1673524" cy="1690778"/>
+          </a:xfrm>
+          <a:prstGeom prst="donut">
+            <a:avLst/>
+          </a:prstGeom>
+        </p:spPr>
+        <p:style>
+          <a:lnRef idx="2">
+            <a:schemeClr val="accent1">
+              <a:shade val="50000"/>
+            </a:schemeClr>
+          </a:lnRef>
+          <a:fillRef idx="1">
+            <a:schemeClr val="accent1"/>
+          </a:fillRef>
+          <a:effectRef idx="0">
+            <a:schemeClr val="accent1"/>
+          </a:effectRef>
+          <a:fontRef idx="minor">
+            <a:schemeClr val="lt1"/>
+          </a:fontRef>
+        </p:style>
+        <p:txBody>
+          <a:bodyPr rtlCol="0" anchor="ctr"/>
+          <a:lstStyle/>
+          <a:p>
+            <a:pPr algn="ctr"/>
+            <a:r>
+              <a:rPr lang="en-US" altLang="ko-KR" dirty="0">
+                <a:solidFill>
+                  <a:schemeClr val="tx1"/>
+                </a:solidFill>
+              </a:rPr>
+              <a:t>AAAA</a:t>
+            </a:r>
+            <a:endParaRPr lang="ko-KR" altLang="en-US" dirty="0">
+              <a:solidFill>
+                <a:schemeClr val="tx1"/>
+              </a:solidFill>
+            </a:endParaRPr>
+          </a:p>
+        </p:txBody>
+      </p:sp>
     </p:spTree>
     <p:extLst>
       <p:ext uri="{BB962C8B-B14F-4D97-AF65-F5344CB8AC3E}">
@@ -11494,6 +11718,64 @@
           </a:fontRef>
         </p:style>
       </p:cxnSp>
+      <p:sp>
+        <p:nvSpPr>
+          <p:cNvPr id="6" name="&quot;허용 안 됨&quot; 기호 5">
+            <a:extLst>
+              <a:ext uri="{FF2B5EF4-FFF2-40B4-BE49-F238E27FC236}">
+                <a16:creationId xmlns:a16="http://schemas.microsoft.com/office/drawing/2014/main" id="{24C1CEDE-6C7E-6F78-4877-759A0396F925}"/>
+              </a:ext>
+            </a:extLst>
+          </p:cNvPr>
+          <p:cNvSpPr/>
+          <p:nvPr/>
+        </p:nvSpPr>
+        <p:spPr>
+          <a:xfrm>
+            <a:off x="2449902" y="4364966"/>
+            <a:ext cx="2070340" cy="1492370"/>
+          </a:xfrm>
+          <a:prstGeom prst="noSmoking">
+            <a:avLst/>
+          </a:prstGeom>
+        </p:spPr>
+        <p:style>
+          <a:lnRef idx="2">
+            <a:schemeClr val="accent1">
+              <a:shade val="50000"/>
+            </a:schemeClr>
+          </a:lnRef>
+          <a:fillRef idx="1">
+            <a:schemeClr val="accent1"/>
+          </a:fillRef>
+          <a:effectRef idx="0">
+            <a:schemeClr val="accent1"/>
+          </a:effectRef>
+          <a:fontRef idx="minor">
+            <a:schemeClr val="lt1"/>
+          </a:fontRef>
+        </p:style>
+        <p:txBody>
+          <a:bodyPr rtlCol="0" anchor="ctr"/>
+          <a:lstStyle/>
+          <a:p>
+            <a:pPr algn="ctr"/>
+            <a:r>
+              <a:rPr lang="en-US" altLang="ko-KR" dirty="0">
+                <a:solidFill>
+                  <a:schemeClr val="tx1"/>
+                </a:solidFill>
+              </a:rPr>
+              <a:t>EEE</a:t>
+            </a:r>
+            <a:endParaRPr lang="ko-KR" altLang="en-US" dirty="0">
+              <a:solidFill>
+                <a:schemeClr val="tx1"/>
+              </a:solidFill>
+            </a:endParaRPr>
+          </a:p>
+        </p:txBody>
+      </p:sp>
     </p:spTree>
     <p:extLst>
       <p:ext uri="{BB962C8B-B14F-4D97-AF65-F5344CB8AC3E}">
@@ -16814,6 +17096,114 @@
           </a:p>
         </p:txBody>
       </p:sp>
+      <p:sp>
+        <p:nvSpPr>
+          <p:cNvPr id="3" name="사각형: 빗면 2">
+            <a:extLst>
+              <a:ext uri="{FF2B5EF4-FFF2-40B4-BE49-F238E27FC236}">
+                <a16:creationId xmlns:a16="http://schemas.microsoft.com/office/drawing/2014/main" id="{B8F43881-77C6-51AE-B5F9-90DF47B18DC1}"/>
+              </a:ext>
+            </a:extLst>
+          </p:cNvPr>
+          <p:cNvSpPr/>
+          <p:nvPr/>
+        </p:nvSpPr>
+        <p:spPr>
+          <a:xfrm>
+            <a:off x="4863063" y="4403819"/>
+            <a:ext cx="1104181" cy="1245933"/>
+          </a:xfrm>
+          <a:prstGeom prst="bevel">
+            <a:avLst/>
+          </a:prstGeom>
+        </p:spPr>
+        <p:style>
+          <a:lnRef idx="2">
+            <a:schemeClr val="accent1">
+              <a:shade val="50000"/>
+            </a:schemeClr>
+          </a:lnRef>
+          <a:fillRef idx="1">
+            <a:schemeClr val="accent1"/>
+          </a:fillRef>
+          <a:effectRef idx="0">
+            <a:schemeClr val="accent1"/>
+          </a:effectRef>
+          <a:fontRef idx="minor">
+            <a:schemeClr val="lt1"/>
+          </a:fontRef>
+        </p:style>
+        <p:txBody>
+          <a:bodyPr rtlCol="0" anchor="ctr"/>
+          <a:lstStyle/>
+          <a:p>
+            <a:pPr algn="ctr"/>
+            <a:r>
+              <a:rPr lang="en-US" altLang="ko-KR" dirty="0"/>
+              <a:t>SSS</a:t>
+            </a:r>
+            <a:endParaRPr lang="ko-KR" altLang="en-US" dirty="0"/>
+          </a:p>
+        </p:txBody>
+      </p:sp>
+      <p:sp>
+        <p:nvSpPr>
+          <p:cNvPr id="4" name="원형: 비어 있음 3">
+            <a:extLst>
+              <a:ext uri="{FF2B5EF4-FFF2-40B4-BE49-F238E27FC236}">
+                <a16:creationId xmlns:a16="http://schemas.microsoft.com/office/drawing/2014/main" id="{A815F440-D615-578E-27A5-F03820AF38B8}"/>
+              </a:ext>
+            </a:extLst>
+          </p:cNvPr>
+          <p:cNvSpPr/>
+          <p:nvPr/>
+        </p:nvSpPr>
+        <p:spPr>
+          <a:xfrm>
+            <a:off x="6978770" y="4166558"/>
+            <a:ext cx="1673524" cy="1690778"/>
+          </a:xfrm>
+          <a:prstGeom prst="donut">
+            <a:avLst/>
+          </a:prstGeom>
+        </p:spPr>
+        <p:style>
+          <a:lnRef idx="2">
+            <a:schemeClr val="accent1">
+              <a:shade val="50000"/>
+            </a:schemeClr>
+          </a:lnRef>
+          <a:fillRef idx="1">
+            <a:schemeClr val="accent1"/>
+          </a:fillRef>
+          <a:effectRef idx="0">
+            <a:schemeClr val="accent1"/>
+          </a:effectRef>
+          <a:fontRef idx="minor">
+            <a:schemeClr val="lt1"/>
+          </a:fontRef>
+        </p:style>
+        <p:txBody>
+          <a:bodyPr rtlCol="0" anchor="ctr"/>
+          <a:lstStyle/>
+          <a:p>
+            <a:pPr algn="ctr"/>
+            <a:r>
+              <a:rPr lang="en-US" altLang="ko-KR" dirty="0">
+                <a:solidFill>
+                  <a:schemeClr val="tx1"/>
+                </a:solidFill>
+              </a:rPr>
+              <a:t>AAAA</a:t>
+            </a:r>
+            <a:endParaRPr lang="ko-KR" altLang="en-US" dirty="0">
+              <a:solidFill>
+                <a:schemeClr val="tx1"/>
+              </a:solidFill>
+            </a:endParaRPr>
+          </a:p>
+        </p:txBody>
+      </p:sp>
     </p:spTree>
     <p:extLst>
       <p:ext uri="{BB962C8B-B14F-4D97-AF65-F5344CB8AC3E}">
@@ -19637,6 +20027,64 @@
               </a:rPr>
               <a:t>]</a:t>
             </a:r>
+          </a:p>
+        </p:txBody>
+      </p:sp>
+      <p:sp>
+        <p:nvSpPr>
+          <p:cNvPr id="6" name="&quot;허용 안 됨&quot; 기호 5">
+            <a:extLst>
+              <a:ext uri="{FF2B5EF4-FFF2-40B4-BE49-F238E27FC236}">
+                <a16:creationId xmlns:a16="http://schemas.microsoft.com/office/drawing/2014/main" id="{29589A9B-1DF3-0296-0748-B2291750D87F}"/>
+              </a:ext>
+            </a:extLst>
+          </p:cNvPr>
+          <p:cNvSpPr/>
+          <p:nvPr/>
+        </p:nvSpPr>
+        <p:spPr>
+          <a:xfrm>
+            <a:off x="2449902" y="4364966"/>
+            <a:ext cx="2070340" cy="1492370"/>
+          </a:xfrm>
+          <a:prstGeom prst="noSmoking">
+            <a:avLst/>
+          </a:prstGeom>
+        </p:spPr>
+        <p:style>
+          <a:lnRef idx="2">
+            <a:schemeClr val="accent1">
+              <a:shade val="50000"/>
+            </a:schemeClr>
+          </a:lnRef>
+          <a:fillRef idx="1">
+            <a:schemeClr val="accent1"/>
+          </a:fillRef>
+          <a:effectRef idx="0">
+            <a:schemeClr val="accent1"/>
+          </a:effectRef>
+          <a:fontRef idx="minor">
+            <a:schemeClr val="lt1"/>
+          </a:fontRef>
+        </p:style>
+        <p:txBody>
+          <a:bodyPr rtlCol="0" anchor="ctr"/>
+          <a:lstStyle/>
+          <a:p>
+            <a:pPr algn="ctr"/>
+            <a:r>
+              <a:rPr lang="en-US" altLang="ko-KR" dirty="0">
+                <a:solidFill>
+                  <a:schemeClr val="tx1"/>
+                </a:solidFill>
+              </a:rPr>
+              <a:t>EEE</a:t>
+            </a:r>
+            <a:endParaRPr lang="ko-KR" altLang="en-US" dirty="0">
+              <a:solidFill>
+                <a:schemeClr val="tx1"/>
+              </a:solidFill>
+            </a:endParaRPr>
           </a:p>
         </p:txBody>
       </p:sp>

</xml_diff>

<commit_message>
DsSystem, Flow,  Real, Call, Alias 객체 구조정리 (ParentType 적용)
</commit_message>
<xml_diff>
--- a/DsDotNet/src/Model/Import/Model.Import.Office/sample/ds.pptx
+++ b/DsDotNet/src/Model/Import/Model.Import.Office/sample/ds.pptx
@@ -4014,7 +4014,7 @@
           </a:prstGeom>
           <a:ln>
             <a:prstDash val="solid"/>
-            <a:headEnd type="oval" w="med" len="med"/>
+            <a:headEnd type="none" w="med" len="med"/>
             <a:tailEnd type="triangle" w="med" len="med"/>
           </a:ln>
         </p:spPr>
@@ -4257,6 +4257,108 @@
           </a:p>
         </p:txBody>
       </p:sp>
+      <p:sp>
+        <p:nvSpPr>
+          <p:cNvPr id="3" name="직사각형 2">
+            <a:extLst>
+              <a:ext uri="{FF2B5EF4-FFF2-40B4-BE49-F238E27FC236}">
+                <a16:creationId xmlns:a16="http://schemas.microsoft.com/office/drawing/2014/main" id="{9C067513-F1C4-F44A-8026-892413CE99CD}"/>
+              </a:ext>
+            </a:extLst>
+          </p:cNvPr>
+          <p:cNvSpPr/>
+          <p:nvPr/>
+        </p:nvSpPr>
+        <p:spPr>
+          <a:xfrm>
+            <a:off x="1774837" y="3317055"/>
+            <a:ext cx="759613" cy="223889"/>
+          </a:xfrm>
+          <a:prstGeom prst="rect">
+            <a:avLst/>
+          </a:prstGeom>
+          <a:solidFill>
+            <a:schemeClr val="accent5">
+              <a:lumMod val="25000"/>
+            </a:schemeClr>
+          </a:solidFill>
+        </p:spPr>
+        <p:style>
+          <a:lnRef idx="2">
+            <a:schemeClr val="accent1">
+              <a:shade val="50000"/>
+            </a:schemeClr>
+          </a:lnRef>
+          <a:fillRef idx="1">
+            <a:schemeClr val="accent1"/>
+          </a:fillRef>
+          <a:effectRef idx="0">
+            <a:schemeClr val="accent1"/>
+          </a:effectRef>
+          <a:fontRef idx="minor">
+            <a:schemeClr val="lt1"/>
+          </a:fontRef>
+        </p:style>
+        <p:txBody>
+          <a:bodyPr rtlCol="0" anchor="ctr"/>
+          <a:lstStyle/>
+          <a:p>
+            <a:pPr algn="ctr"/>
+            <a:r>
+              <a:rPr lang="en-US" altLang="ko-KR" sz="1100" dirty="0"/>
+              <a:t>A</a:t>
+            </a:r>
+            <a:endParaRPr lang="ko-KR" altLang="en-US" sz="1200" dirty="0"/>
+          </a:p>
+        </p:txBody>
+      </p:sp>
+      <p:cxnSp>
+        <p:nvCxnSpPr>
+          <p:cNvPr id="12" name="연결선: 꺾임 11">
+            <a:extLst>
+              <a:ext uri="{FF2B5EF4-FFF2-40B4-BE49-F238E27FC236}">
+                <a16:creationId xmlns:a16="http://schemas.microsoft.com/office/drawing/2014/main" id="{0F3B2FC6-A0B0-2770-009F-84229B08A7AC}"/>
+              </a:ext>
+            </a:extLst>
+          </p:cNvPr>
+          <p:cNvCxnSpPr>
+            <a:cxnSpLocks/>
+            <a:stCxn id="3" idx="0"/>
+            <a:endCxn id="8" idx="0"/>
+          </p:cNvCxnSpPr>
+          <p:nvPr/>
+        </p:nvCxnSpPr>
+        <p:spPr>
+          <a:xfrm rot="5400000" flipH="1" flipV="1">
+            <a:off x="4430358" y="577205"/>
+            <a:ext cx="464137" cy="5015565"/>
+          </a:xfrm>
+          <a:prstGeom prst="bentConnector3">
+            <a:avLst>
+              <a:gd name="adj1" fmla="val 149253"/>
+            </a:avLst>
+          </a:prstGeom>
+          <a:ln>
+            <a:prstDash val="solid"/>
+            <a:headEnd type="none" w="med" len="med"/>
+            <a:tailEnd type="triangle" w="med" len="med"/>
+          </a:ln>
+        </p:spPr>
+        <p:style>
+          <a:lnRef idx="1">
+            <a:schemeClr val="accent1"/>
+          </a:lnRef>
+          <a:fillRef idx="0">
+            <a:schemeClr val="accent1"/>
+          </a:fillRef>
+          <a:effectRef idx="0">
+            <a:schemeClr val="accent1"/>
+          </a:effectRef>
+          <a:fontRef idx="minor">
+            <a:schemeClr val="tx1"/>
+          </a:fontRef>
+        </p:style>
+      </p:cxnSp>
     </p:spTree>
     <p:extLst>
       <p:ext uri="{BB962C8B-B14F-4D97-AF65-F5344CB8AC3E}">

</xml_diff>

<commit_message>
Model.Import.Viewer 버그수정 convert core
</commit_message>
<xml_diff>
--- a/DsDotNet/src/Model/Import/Model.Import.Office/sample/ds.pptx
+++ b/DsDotNet/src/Model/Import/Model.Import.Office/sample/ds.pptx
@@ -206,7 +206,7 @@
           <a:p>
             <a:fld id="{2B89E2EC-FE27-4C5F-972C-0BECC28DD028}" type="datetimeFigureOut">
               <a:rPr lang="ko-KR" altLang="en-US" smtClean="0"/>
-              <a:t>2022-10-19</a:t>
+              <a:t>2022-10-20</a:t>
             </a:fld>
             <a:endParaRPr lang="ko-KR" altLang="en-US"/>
           </a:p>
@@ -620,7 +620,7 @@
           <a:p>
             <a:fld id="{74A2778E-F063-4908-8427-F8B35A4747CF}" type="datetimeFigureOut">
               <a:rPr lang="ko-KR" altLang="en-US" smtClean="0"/>
-              <a:t>2022-10-19</a:t>
+              <a:t>2022-10-20</a:t>
             </a:fld>
             <a:endParaRPr lang="ko-KR" altLang="en-US"/>
           </a:p>
@@ -818,7 +818,7 @@
           <a:p>
             <a:fld id="{74A2778E-F063-4908-8427-F8B35A4747CF}" type="datetimeFigureOut">
               <a:rPr lang="ko-KR" altLang="en-US" smtClean="0"/>
-              <a:t>2022-10-19</a:t>
+              <a:t>2022-10-20</a:t>
             </a:fld>
             <a:endParaRPr lang="ko-KR" altLang="en-US"/>
           </a:p>
@@ -1026,7 +1026,7 @@
           <a:p>
             <a:fld id="{74A2778E-F063-4908-8427-F8B35A4747CF}" type="datetimeFigureOut">
               <a:rPr lang="ko-KR" altLang="en-US" smtClean="0"/>
-              <a:t>2022-10-19</a:t>
+              <a:t>2022-10-20</a:t>
             </a:fld>
             <a:endParaRPr lang="ko-KR" altLang="en-US"/>
           </a:p>
@@ -1224,7 +1224,7 @@
           <a:p>
             <a:fld id="{74A2778E-F063-4908-8427-F8B35A4747CF}" type="datetimeFigureOut">
               <a:rPr lang="ko-KR" altLang="en-US" smtClean="0"/>
-              <a:t>2022-10-19</a:t>
+              <a:t>2022-10-20</a:t>
             </a:fld>
             <a:endParaRPr lang="ko-KR" altLang="en-US"/>
           </a:p>
@@ -1499,7 +1499,7 @@
           <a:p>
             <a:fld id="{74A2778E-F063-4908-8427-F8B35A4747CF}" type="datetimeFigureOut">
               <a:rPr lang="ko-KR" altLang="en-US" smtClean="0"/>
-              <a:t>2022-10-19</a:t>
+              <a:t>2022-10-20</a:t>
             </a:fld>
             <a:endParaRPr lang="ko-KR" altLang="en-US"/>
           </a:p>
@@ -1764,7 +1764,7 @@
           <a:p>
             <a:fld id="{74A2778E-F063-4908-8427-F8B35A4747CF}" type="datetimeFigureOut">
               <a:rPr lang="ko-KR" altLang="en-US" smtClean="0"/>
-              <a:t>2022-10-19</a:t>
+              <a:t>2022-10-20</a:t>
             </a:fld>
             <a:endParaRPr lang="ko-KR" altLang="en-US"/>
           </a:p>
@@ -2176,7 +2176,7 @@
           <a:p>
             <a:fld id="{74A2778E-F063-4908-8427-F8B35A4747CF}" type="datetimeFigureOut">
               <a:rPr lang="ko-KR" altLang="en-US" smtClean="0"/>
-              <a:t>2022-10-19</a:t>
+              <a:t>2022-10-20</a:t>
             </a:fld>
             <a:endParaRPr lang="ko-KR" altLang="en-US"/>
           </a:p>
@@ -2317,7 +2317,7 @@
           <a:p>
             <a:fld id="{74A2778E-F063-4908-8427-F8B35A4747CF}" type="datetimeFigureOut">
               <a:rPr lang="ko-KR" altLang="en-US" smtClean="0"/>
-              <a:t>2022-10-19</a:t>
+              <a:t>2022-10-20</a:t>
             </a:fld>
             <a:endParaRPr lang="ko-KR" altLang="en-US"/>
           </a:p>
@@ -2430,7 +2430,7 @@
           <a:p>
             <a:fld id="{74A2778E-F063-4908-8427-F8B35A4747CF}" type="datetimeFigureOut">
               <a:rPr lang="ko-KR" altLang="en-US" smtClean="0"/>
-              <a:t>2022-10-19</a:t>
+              <a:t>2022-10-20</a:t>
             </a:fld>
             <a:endParaRPr lang="ko-KR" altLang="en-US"/>
           </a:p>
@@ -2741,7 +2741,7 @@
           <a:p>
             <a:fld id="{74A2778E-F063-4908-8427-F8B35A4747CF}" type="datetimeFigureOut">
               <a:rPr lang="ko-KR" altLang="en-US" smtClean="0"/>
-              <a:t>2022-10-19</a:t>
+              <a:t>2022-10-20</a:t>
             </a:fld>
             <a:endParaRPr lang="ko-KR" altLang="en-US"/>
           </a:p>
@@ -3029,7 +3029,7 @@
           <a:p>
             <a:fld id="{74A2778E-F063-4908-8427-F8B35A4747CF}" type="datetimeFigureOut">
               <a:rPr lang="ko-KR" altLang="en-US" smtClean="0"/>
-              <a:t>2022-10-19</a:t>
+              <a:t>2022-10-20</a:t>
             </a:fld>
             <a:endParaRPr lang="ko-KR" altLang="en-US"/>
           </a:p>
@@ -3270,7 +3270,7 @@
           <a:p>
             <a:fld id="{74A2778E-F063-4908-8427-F8B35A4747CF}" type="datetimeFigureOut">
               <a:rPr lang="ko-KR" altLang="en-US" smtClean="0"/>
-              <a:t>2022-10-19</a:t>
+              <a:t>2022-10-20</a:t>
             </a:fld>
             <a:endParaRPr lang="ko-KR" altLang="en-US"/>
           </a:p>
@@ -3671,7 +3671,7 @@
 </file>
 
 <file path=ppt/slides/slide1.xml><?xml version="1.0" encoding="utf-8"?>
-<p:sld xmlns:a="http://schemas.openxmlformats.org/drawingml/2006/main" xmlns:r="http://schemas.openxmlformats.org/officeDocument/2006/relationships" xmlns:p="http://schemas.openxmlformats.org/presentationml/2006/main">
+<p:sld xmlns:a="http://schemas.openxmlformats.org/drawingml/2006/main" xmlns:r="http://schemas.openxmlformats.org/officeDocument/2006/relationships" xmlns:p="http://schemas.openxmlformats.org/presentationml/2006/main" show="0">
   <p:cSld>
     <p:spTree>
       <p:nvGrpSpPr>
@@ -4272,7 +4272,7 @@
         <p:spPr>
           <a:xfrm>
             <a:off x="1774837" y="3317055"/>
-            <a:ext cx="759613" cy="223889"/>
+            <a:ext cx="2070340" cy="849503"/>
           </a:xfrm>
           <a:prstGeom prst="rect">
             <a:avLst/>
@@ -4330,8 +4330,8 @@
         </p:nvCxnSpPr>
         <p:spPr>
           <a:xfrm rot="5400000" flipH="1" flipV="1">
-            <a:off x="4430358" y="577205"/>
-            <a:ext cx="464137" cy="5015565"/>
+            <a:off x="4758040" y="904886"/>
+            <a:ext cx="464137" cy="4360202"/>
           </a:xfrm>
           <a:prstGeom prst="bentConnector3">
             <a:avLst>
@@ -11654,174 +11654,6 @@
       </p:cxnSp>
       <p:sp>
         <p:nvSpPr>
-          <p:cNvPr id="8" name="직사각형 7">
-            <a:extLst>
-              <a:ext uri="{FF2B5EF4-FFF2-40B4-BE49-F238E27FC236}">
-                <a16:creationId xmlns:a16="http://schemas.microsoft.com/office/drawing/2014/main" id="{589B3083-9267-376F-485D-0E44F0425077}"/>
-              </a:ext>
-            </a:extLst>
-          </p:cNvPr>
-          <p:cNvSpPr/>
-          <p:nvPr/>
-        </p:nvSpPr>
-        <p:spPr bwMode="auto">
-          <a:xfrm>
-            <a:off x="7780050" y="4569980"/>
-            <a:ext cx="2305242" cy="853766"/>
-          </a:xfrm>
-          <a:prstGeom prst="rect">
-            <a:avLst/>
-          </a:prstGeom>
-          <a:noFill/>
-          <a:ln>
-            <a:headEnd type="none" w="med" len="med"/>
-            <a:tailEnd type="none" w="med" len="med"/>
-          </a:ln>
-        </p:spPr>
-        <p:style>
-          <a:lnRef idx="2">
-            <a:schemeClr val="dk1"/>
-          </a:lnRef>
-          <a:fillRef idx="1">
-            <a:schemeClr val="lt1"/>
-          </a:fillRef>
-          <a:effectRef idx="0">
-            <a:schemeClr val="dk1"/>
-          </a:effectRef>
-          <a:fontRef idx="minor">
-            <a:schemeClr val="dk1"/>
-          </a:fontRef>
-        </p:style>
-        <p:txBody>
-          <a:bodyPr vert="horz" wrap="none" lIns="74295" tIns="37148" rIns="74295" bIns="37148" numCol="1" rtlCol="0" anchor="t" anchorCtr="0" compatLnSpc="1">
-            <a:prstTxWarp prst="textNoShape">
-              <a:avLst/>
-            </a:prstTxWarp>
-          </a:bodyPr>
-          <a:lstStyle/>
-          <a:p>
-            <a:pPr algn="ctr"/>
-            <a:r>
-              <a:rPr lang="en-US" altLang="ko-KR" sz="900" dirty="0"/>
-              <a:t>A </a:t>
-            </a:r>
-            <a:r>
-              <a:rPr lang="ko-KR" altLang="en-US" sz="900" dirty="0" err="1"/>
-              <a:t>ㅁㅁㅁ</a:t>
-            </a:r>
-            <a:endParaRPr lang="ko-KR" altLang="en-US" sz="900" dirty="0">
-              <a:ea typeface="현대하모니 M" panose="02020603020101020101"/>
-            </a:endParaRPr>
-          </a:p>
-        </p:txBody>
-      </p:sp>
-      <p:sp>
-        <p:nvSpPr>
-          <p:cNvPr id="9" name="직사각형 8">
-            <a:extLst>
-              <a:ext uri="{FF2B5EF4-FFF2-40B4-BE49-F238E27FC236}">
-                <a16:creationId xmlns:a16="http://schemas.microsoft.com/office/drawing/2014/main" id="{5772A739-4A34-5CA7-ADA4-F3C1DA795017}"/>
-              </a:ext>
-            </a:extLst>
-          </p:cNvPr>
-          <p:cNvSpPr/>
-          <p:nvPr/>
-        </p:nvSpPr>
-        <p:spPr bwMode="auto">
-          <a:xfrm>
-            <a:off x="7098732" y="5631753"/>
-            <a:ext cx="2305242" cy="853766"/>
-          </a:xfrm>
-          <a:prstGeom prst="rect">
-            <a:avLst/>
-          </a:prstGeom>
-          <a:noFill/>
-          <a:ln>
-            <a:headEnd type="none" w="med" len="med"/>
-            <a:tailEnd type="none" w="med" len="med"/>
-          </a:ln>
-        </p:spPr>
-        <p:style>
-          <a:lnRef idx="2">
-            <a:schemeClr val="dk1"/>
-          </a:lnRef>
-          <a:fillRef idx="1">
-            <a:schemeClr val="lt1"/>
-          </a:fillRef>
-          <a:effectRef idx="0">
-            <a:schemeClr val="dk1"/>
-          </a:effectRef>
-          <a:fontRef idx="minor">
-            <a:schemeClr val="dk1"/>
-          </a:fontRef>
-        </p:style>
-        <p:txBody>
-          <a:bodyPr vert="horz" wrap="none" lIns="74295" tIns="37148" rIns="74295" bIns="37148" numCol="1" rtlCol="0" anchor="t" anchorCtr="0" compatLnSpc="1">
-            <a:prstTxWarp prst="textNoShape">
-              <a:avLst/>
-            </a:prstTxWarp>
-          </a:bodyPr>
-          <a:lstStyle/>
-          <a:p>
-            <a:pPr algn="ctr"/>
-            <a:r>
-              <a:rPr lang="en-US" altLang="ko-KR" sz="900" dirty="0">
-                <a:ea typeface="현대하모니 M" panose="02020603020101020101"/>
-              </a:rPr>
-              <a:t>R1</a:t>
-            </a:r>
-            <a:endParaRPr lang="ko-KR" altLang="en-US" sz="900" dirty="0">
-              <a:ea typeface="현대하모니 M" panose="02020603020101020101"/>
-            </a:endParaRPr>
-          </a:p>
-        </p:txBody>
-      </p:sp>
-      <p:cxnSp>
-        <p:nvCxnSpPr>
-          <p:cNvPr id="14" name="직선 화살표 연결선 13">
-            <a:extLst>
-              <a:ext uri="{FF2B5EF4-FFF2-40B4-BE49-F238E27FC236}">
-                <a16:creationId xmlns:a16="http://schemas.microsoft.com/office/drawing/2014/main" id="{9D4A5FE2-1239-26A1-91C2-8CA79A49EDB4}"/>
-              </a:ext>
-            </a:extLst>
-          </p:cNvPr>
-          <p:cNvCxnSpPr>
-            <a:cxnSpLocks/>
-            <a:stCxn id="9" idx="0"/>
-            <a:endCxn id="8" idx="2"/>
-          </p:cNvCxnSpPr>
-          <p:nvPr/>
-        </p:nvCxnSpPr>
-        <p:spPr>
-          <a:xfrm flipV="1">
-            <a:off x="8251353" y="5423746"/>
-            <a:ext cx="681318" cy="208007"/>
-          </a:xfrm>
-          <a:prstGeom prst="straightConnector1">
-            <a:avLst/>
-          </a:prstGeom>
-          <a:ln>
-            <a:headEnd type="diamond" w="med" len="med"/>
-            <a:tailEnd type="triangle" w="med" len="med"/>
-          </a:ln>
-        </p:spPr>
-        <p:style>
-          <a:lnRef idx="1">
-            <a:schemeClr val="accent1"/>
-          </a:lnRef>
-          <a:fillRef idx="0">
-            <a:schemeClr val="accent1"/>
-          </a:fillRef>
-          <a:effectRef idx="0">
-            <a:schemeClr val="accent1"/>
-          </a:effectRef>
-          <a:fontRef idx="minor">
-            <a:schemeClr val="tx1"/>
-          </a:fontRef>
-        </p:style>
-      </p:cxnSp>
-      <p:sp>
-        <p:nvSpPr>
           <p:cNvPr id="6" name="&quot;허용 안 됨&quot; 기호 5">
             <a:extLst>
               <a:ext uri="{FF2B5EF4-FFF2-40B4-BE49-F238E27FC236}">
@@ -11878,6 +11710,108 @@
           </a:p>
         </p:txBody>
       </p:sp>
+      <p:sp>
+        <p:nvSpPr>
+          <p:cNvPr id="15" name="순서도: 대체 처리 14">
+            <a:extLst>
+              <a:ext uri="{FF2B5EF4-FFF2-40B4-BE49-F238E27FC236}">
+                <a16:creationId xmlns:a16="http://schemas.microsoft.com/office/drawing/2014/main" id="{1CE51D4B-F3B3-99A3-304D-1EEB9DFF892D}"/>
+              </a:ext>
+            </a:extLst>
+          </p:cNvPr>
+          <p:cNvSpPr/>
+          <p:nvPr/>
+        </p:nvSpPr>
+        <p:spPr bwMode="auto">
+          <a:xfrm>
+            <a:off x="9044074" y="1176036"/>
+            <a:ext cx="1429500" cy="168372"/>
+          </a:xfrm>
+          <a:prstGeom prst="flowChartAlternateProcess">
+            <a:avLst/>
+          </a:prstGeom>
+          <a:solidFill>
+            <a:schemeClr val="accent2"/>
+          </a:solidFill>
+          <a:ln w="22225" cap="flat" cmpd="sng" algn="ctr">
+            <a:solidFill>
+              <a:schemeClr val="tx1"/>
+            </a:solidFill>
+            <a:prstDash val="solid"/>
+            <a:round/>
+            <a:headEnd type="none" w="med" len="med"/>
+            <a:tailEnd type="none" w="med" len="med"/>
+          </a:ln>
+          <a:effectLst/>
+        </p:spPr>
+        <p:txBody>
+          <a:bodyPr vert="horz" wrap="none" lIns="74295" tIns="37148" rIns="74295" bIns="37148" numCol="1" rtlCol="0" anchor="ctr" anchorCtr="0" compatLnSpc="1">
+            <a:prstTxWarp prst="textNoShape">
+              <a:avLst/>
+            </a:prstTxWarp>
+          </a:bodyPr>
+          <a:lstStyle/>
+          <a:p>
+            <a:pPr algn="ctr"/>
+            <a:r>
+              <a:rPr lang="en-US" altLang="ko-KR" sz="900" dirty="0" err="1"/>
+              <a:t>REINF_Shift.RET</a:t>
+            </a:r>
+            <a:endParaRPr lang="ko-KR" altLang="en-US" sz="900" dirty="0"/>
+          </a:p>
+        </p:txBody>
+      </p:sp>
+      <p:sp>
+        <p:nvSpPr>
+          <p:cNvPr id="19" name="순서도: 대체 처리 18">
+            <a:extLst>
+              <a:ext uri="{FF2B5EF4-FFF2-40B4-BE49-F238E27FC236}">
+                <a16:creationId xmlns:a16="http://schemas.microsoft.com/office/drawing/2014/main" id="{76E81E7B-6735-0F2C-BE14-EE0B6A7EC282}"/>
+              </a:ext>
+            </a:extLst>
+          </p:cNvPr>
+          <p:cNvSpPr/>
+          <p:nvPr/>
+        </p:nvSpPr>
+        <p:spPr bwMode="auto">
+          <a:xfrm>
+            <a:off x="8851417" y="2321510"/>
+            <a:ext cx="1429500" cy="168372"/>
+          </a:xfrm>
+          <a:prstGeom prst="flowChartAlternateProcess">
+            <a:avLst/>
+          </a:prstGeom>
+          <a:solidFill>
+            <a:schemeClr val="accent2"/>
+          </a:solidFill>
+          <a:ln w="22225" cap="flat" cmpd="sng" algn="ctr">
+            <a:solidFill>
+              <a:schemeClr val="tx1"/>
+            </a:solidFill>
+            <a:prstDash val="solid"/>
+            <a:round/>
+            <a:headEnd type="none" w="med" len="med"/>
+            <a:tailEnd type="none" w="med" len="med"/>
+          </a:ln>
+          <a:effectLst/>
+        </p:spPr>
+        <p:txBody>
+          <a:bodyPr vert="horz" wrap="none" lIns="74295" tIns="37148" rIns="74295" bIns="37148" numCol="1" rtlCol="0" anchor="ctr" anchorCtr="0" compatLnSpc="1">
+            <a:prstTxWarp prst="textNoShape">
+              <a:avLst/>
+            </a:prstTxWarp>
+          </a:bodyPr>
+          <a:lstStyle/>
+          <a:p>
+            <a:pPr algn="ctr"/>
+            <a:r>
+              <a:rPr lang="en-US" altLang="ko-KR" sz="900" dirty="0" err="1"/>
+              <a:t>REINF_Shift.RET</a:t>
+            </a:r>
+            <a:endParaRPr lang="ko-KR" altLang="en-US" sz="900" dirty="0"/>
+          </a:p>
+        </p:txBody>
+      </p:sp>
     </p:spTree>
     <p:extLst>
       <p:ext uri="{BB962C8B-B14F-4D97-AF65-F5344CB8AC3E}">
@@ -11892,7 +11826,7 @@
 </file>
 
 <file path=ppt/slides/slide3.xml><?xml version="1.0" encoding="utf-8"?>
-<p:sld xmlns:a="http://schemas.openxmlformats.org/drawingml/2006/main" xmlns:r="http://schemas.openxmlformats.org/officeDocument/2006/relationships" xmlns:p="http://schemas.openxmlformats.org/presentationml/2006/main">
+<p:sld xmlns:a="http://schemas.openxmlformats.org/drawingml/2006/main" xmlns:r="http://schemas.openxmlformats.org/officeDocument/2006/relationships" xmlns:p="http://schemas.openxmlformats.org/presentationml/2006/main" show="0">
   <p:cSld>
     <p:spTree>
       <p:nvGrpSpPr>
@@ -17320,7 +17254,7 @@
 </file>
 
 <file path=ppt/slides/slide4.xml><?xml version="1.0" encoding="utf-8"?>
-<p:sld xmlns:a="http://schemas.openxmlformats.org/drawingml/2006/main" xmlns:r="http://schemas.openxmlformats.org/officeDocument/2006/relationships" xmlns:p="http://schemas.openxmlformats.org/presentationml/2006/main">
+<p:sld xmlns:a="http://schemas.openxmlformats.org/drawingml/2006/main" xmlns:r="http://schemas.openxmlformats.org/officeDocument/2006/relationships" xmlns:p="http://schemas.openxmlformats.org/presentationml/2006/main" show="0">
   <p:cSld>
     <p:spTree>
       <p:nvGrpSpPr>
@@ -20204,7 +20138,7 @@
 </file>
 
 <file path=ppt/slides/slide5.xml><?xml version="1.0" encoding="utf-8"?>
-<p:sld xmlns:a="http://schemas.openxmlformats.org/drawingml/2006/main" xmlns:r="http://schemas.openxmlformats.org/officeDocument/2006/relationships" xmlns:p="http://schemas.openxmlformats.org/presentationml/2006/main">
+<p:sld xmlns:a="http://schemas.openxmlformats.org/drawingml/2006/main" xmlns:r="http://schemas.openxmlformats.org/officeDocument/2006/relationships" xmlns:p="http://schemas.openxmlformats.org/presentationml/2006/main" show="0">
   <p:cSld>
     <p:spTree>
       <p:nvGrpSpPr>

</xml_diff>